<commit_message>
Added the type of field which is plotted
</commit_message>
<xml_diff>
--- a/Poster/SOFT2018_Hillairet_HFSS-IC-LH-coupling.pptx
+++ b/Poster/SOFT2018_Hillairet_HFSS-IC-LH-coupling.pptx
@@ -569,7 +569,7 @@
             <a:fld id="{6CECBBB4-AF1B-4C95-8F5D-33BC293A4A32}" type="datetimeFigureOut">
               <a:rPr lang="fr-FR"/>
               <a:pPr/>
-              <a:t>10/09/2018</a:t>
+              <a:t>12/09/2018</a:t>
             </a:fld>
             <a:endParaRPr lang="fr-FR"/>
           </a:p>
@@ -5831,17 +5831,6 @@
               </a:rPr>
               <a:t>	Summary</a:t>
             </a:r>
-            <a:endParaRPr kumimoji="0" lang="en-US" sz="2400" b="0" i="0" u="none" strike="noStrike" cap="none" normalizeH="0" baseline="0" dirty="0" smtClean="0">
-              <a:ln>
-                <a:noFill/>
-              </a:ln>
-              <a:solidFill>
-                <a:schemeClr val="bg1"/>
-              </a:solidFill>
-              <a:effectLst/>
-              <a:latin typeface="Arial" panose="020B0604020202020204" pitchFamily="34" charset="0"/>
-              <a:cs typeface="Arial" panose="020B0604020202020204" pitchFamily="34" charset="0"/>
-            </a:endParaRPr>
           </a:p>
         </p:txBody>
       </p:sp>
@@ -6063,8 +6052,8 @@
           </a:p>
         </p:txBody>
       </p:sp>
-      <mc:AlternateContent xmlns:mc="http://schemas.openxmlformats.org/markup-compatibility/2006">
-        <mc:Choice xmlns:a14="http://schemas.microsoft.com/office/drawing/2010/main" Requires="a14">
+      <mc:AlternateContent xmlns:mc="http://schemas.openxmlformats.org/markup-compatibility/2006" xmlns:a14="http://schemas.microsoft.com/office/drawing/2010/main">
+        <mc:Choice Requires="a14">
           <p:sp>
             <p:nvSpPr>
               <p:cNvPr id="159" name="TextBox 9"/>
@@ -6232,7 +6221,7 @@
             </p:txBody>
           </p:sp>
         </mc:Choice>
-        <mc:Fallback>
+        <mc:Fallback xmlns="">
           <p:sp>
             <p:nvSpPr>
               <p:cNvPr id="159" name="TextBox 9"/>
@@ -6271,8 +6260,8 @@
           </p:sp>
         </mc:Fallback>
       </mc:AlternateContent>
-      <mc:AlternateContent xmlns:mc="http://schemas.openxmlformats.org/markup-compatibility/2006">
-        <mc:Choice xmlns:a14="http://schemas.microsoft.com/office/drawing/2010/main" Requires="a14">
+      <mc:AlternateContent xmlns:mc="http://schemas.openxmlformats.org/markup-compatibility/2006" xmlns:a14="http://schemas.microsoft.com/office/drawing/2010/main">
+        <mc:Choice Requires="a14">
           <p:sp>
             <p:nvSpPr>
               <p:cNvPr id="160" name="TextBox 10"/>
@@ -6399,7 +6388,7 @@
             </p:txBody>
           </p:sp>
         </mc:Choice>
-        <mc:Fallback>
+        <mc:Fallback xmlns="">
           <p:sp>
             <p:nvSpPr>
               <p:cNvPr id="160" name="TextBox 10"/>
@@ -6438,8 +6427,8 @@
           </p:sp>
         </mc:Fallback>
       </mc:AlternateContent>
-      <mc:AlternateContent xmlns:mc="http://schemas.openxmlformats.org/markup-compatibility/2006">
-        <mc:Choice xmlns:a14="http://schemas.microsoft.com/office/drawing/2010/main" Requires="a14">
+      <mc:AlternateContent xmlns:mc="http://schemas.openxmlformats.org/markup-compatibility/2006" xmlns:a14="http://schemas.microsoft.com/office/drawing/2010/main">
+        <mc:Choice Requires="a14">
           <p:sp>
             <p:nvSpPr>
               <p:cNvPr id="161" name="TextBox 42"/>
@@ -6568,7 +6557,7 @@
             </p:txBody>
           </p:sp>
         </mc:Choice>
-        <mc:Fallback>
+        <mc:Fallback xmlns="">
           <p:sp>
             <p:nvSpPr>
               <p:cNvPr id="161" name="TextBox 42"/>
@@ -7262,9 +7251,6 @@
               </a:rPr>
               <a:t>ANSYS HFSS can be used to model 3D antenna-wave coupling problems to tokamak edge plasma.</a:t>
             </a:r>
-            <a:endParaRPr lang="en-US" dirty="0" smtClean="0">
-              <a:latin typeface="Arial"/>
-            </a:endParaRPr>
           </a:p>
           <a:p>
             <a:pPr lvl="1"/>
@@ -7490,7 +7476,7 @@
         </p:nvGrpSpPr>
         <p:grpSpPr>
           <a:xfrm>
-            <a:off x="7924227" y="4516980"/>
+            <a:off x="7924227" y="4825206"/>
             <a:ext cx="2259833" cy="973634"/>
             <a:chOff x="-4179464" y="4896510"/>
             <a:chExt cx="4778338" cy="2266851"/>
@@ -8147,8 +8133,8 @@
           </p:style>
         </p:cxnSp>
       </p:grpSp>
-      <mc:AlternateContent xmlns:mc="http://schemas.openxmlformats.org/markup-compatibility/2006">
-        <mc:Choice xmlns:a14="http://schemas.microsoft.com/office/drawing/2010/main" Requires="a14">
+      <mc:AlternateContent xmlns:mc="http://schemas.openxmlformats.org/markup-compatibility/2006" xmlns:a14="http://schemas.microsoft.com/office/drawing/2010/main">
+        <mc:Choice Requires="a14">
           <p:sp>
             <p:nvSpPr>
               <p:cNvPr id="198" name="TextBox 9"/>
@@ -8197,14 +8183,7 @@
                           <a:latin typeface="Cambria Math"/>
                           <a:ea typeface="Cambria Math"/>
                         </a:rPr>
-                        <m:t> </m:t>
-                      </m:r>
-                      <m:r>
-                        <a:rPr lang="en-US" sz="1100" b="0" i="1" smtClean="0">
-                          <a:latin typeface="Cambria Math"/>
-                          <a:ea typeface="Cambria Math"/>
-                        </a:rPr>
-                        <m:t>(</m:t>
+                        <m:t> (</m:t>
                       </m:r>
                       <m:r>
                         <a:rPr lang="en-US" sz="1100" b="0" i="1" smtClean="0">
@@ -8466,7 +8445,7 @@
             </p:txBody>
           </p:sp>
         </mc:Choice>
-        <mc:Fallback>
+        <mc:Fallback xmlns="">
           <p:sp>
             <p:nvSpPr>
               <p:cNvPr id="198" name="TextBox 9"/>
@@ -8693,7 +8672,7 @@
         </p:nvSpPr>
         <p:spPr>
           <a:xfrm>
-            <a:off x="3243470" y="6168113"/>
+            <a:off x="3380236" y="6168113"/>
             <a:ext cx="3347440" cy="523220"/>
           </a:xfrm>
           <a:prstGeom prst="rect">
@@ -8746,51 +8725,6 @@
               <a:solidFill>
                 <a:schemeClr val="bg1">
                   <a:lumMod val="95000"/>
-                </a:schemeClr>
-              </a:solidFill>
-              <a:latin typeface="Arial" panose="020B0604020202020204" pitchFamily="34" charset="0"/>
-              <a:cs typeface="Arial" panose="020B0604020202020204" pitchFamily="34" charset="0"/>
-            </a:endParaRPr>
-          </a:p>
-        </p:txBody>
-      </p:sp>
-      <p:sp>
-        <p:nvSpPr>
-          <p:cNvPr id="76" name="Rectangle 75"/>
-          <p:cNvSpPr/>
-          <p:nvPr/>
-        </p:nvSpPr>
-        <p:spPr>
-          <a:xfrm>
-            <a:off x="3218481" y="6639073"/>
-            <a:ext cx="383395" cy="527919"/>
-          </a:xfrm>
-          <a:prstGeom prst="rect">
-            <a:avLst/>
-          </a:prstGeom>
-        </p:spPr>
-        <p:txBody>
-          <a:bodyPr wrap="none">
-            <a:spAutoFit/>
-          </a:bodyPr>
-          <a:lstStyle/>
-          <a:p>
-            <a:r>
-              <a:rPr lang="en-US" dirty="0" smtClean="0">
-                <a:solidFill>
-                  <a:schemeClr val="bg1">
-                    <a:lumMod val="75000"/>
-                  </a:schemeClr>
-                </a:solidFill>
-                <a:latin typeface="Arial" panose="020B0604020202020204" pitchFamily="34" charset="0"/>
-                <a:cs typeface="Arial" panose="020B0604020202020204" pitchFamily="34" charset="0"/>
-              </a:rPr>
-              <a:t>x</a:t>
-            </a:r>
-            <a:endParaRPr lang="en-US" dirty="0">
-              <a:solidFill>
-                <a:schemeClr val="bg1">
-                  <a:lumMod val="75000"/>
                 </a:schemeClr>
               </a:solidFill>
               <a:latin typeface="Arial" panose="020B0604020202020204" pitchFamily="34" charset="0"/>
@@ -9546,7 +9480,7 @@
         </p:nvCxnSpPr>
         <p:spPr bwMode="auto">
           <a:xfrm>
-            <a:off x="8590159" y="4654369"/>
+            <a:off x="8590159" y="4962595"/>
             <a:ext cx="1014148" cy="0"/>
           </a:xfrm>
           <a:prstGeom prst="straightConnector1">
@@ -9586,7 +9520,7 @@
         </p:nvSpPr>
         <p:spPr>
           <a:xfrm>
-            <a:off x="8815908" y="4358680"/>
+            <a:off x="8815908" y="4666906"/>
             <a:ext cx="603050" cy="276999"/>
           </a:xfrm>
           <a:prstGeom prst="rect">
@@ -9715,8 +9649,8 @@
         </p:nvCxnSpPr>
         <p:spPr bwMode="auto">
           <a:xfrm>
-            <a:off x="83347" y="7779632"/>
-            <a:ext cx="6408712" cy="0"/>
+            <a:off x="102940" y="7761344"/>
+            <a:ext cx="6389119" cy="18288"/>
           </a:xfrm>
           <a:prstGeom prst="line">
             <a:avLst/>
@@ -10153,6 +10087,168 @@
           </a:p>
         </p:txBody>
       </p:sp>
+      <p:sp>
+        <p:nvSpPr>
+          <p:cNvPr id="2" name="ZoneTexte 1"/>
+          <p:cNvSpPr txBox="1"/>
+          <p:nvPr/>
+        </p:nvSpPr>
+        <p:spPr>
+          <a:xfrm>
+            <a:off x="2600576" y="5886499"/>
+            <a:ext cx="457176" cy="369332"/>
+          </a:xfrm>
+          <a:prstGeom prst="rect">
+            <a:avLst/>
+          </a:prstGeom>
+          <a:noFill/>
+          <a:ln>
+            <a:solidFill>
+              <a:schemeClr val="tx1">
+                <a:lumMod val="75000"/>
+                <a:lumOff val="25000"/>
+              </a:schemeClr>
+            </a:solidFill>
+          </a:ln>
+        </p:spPr>
+        <p:txBody>
+          <a:bodyPr wrap="none" rtlCol="0">
+            <a:spAutoFit/>
+          </a:bodyPr>
+          <a:lstStyle/>
+          <a:p>
+            <a:r>
+              <a:rPr lang="fr-FR" sz="1800" dirty="0" smtClean="0">
+                <a:solidFill>
+                  <a:schemeClr val="bg1">
+                    <a:lumMod val="85000"/>
+                  </a:schemeClr>
+                </a:solidFill>
+                <a:latin typeface="Arial" panose="020B0604020202020204" pitchFamily="34" charset="0"/>
+                <a:cs typeface="Arial" panose="020B0604020202020204" pitchFamily="34" charset="0"/>
+              </a:rPr>
+              <a:t>|E|</a:t>
+            </a:r>
+            <a:endParaRPr lang="fr-FR" sz="1800" dirty="0">
+              <a:solidFill>
+                <a:schemeClr val="bg1">
+                  <a:lumMod val="85000"/>
+                </a:schemeClr>
+              </a:solidFill>
+              <a:latin typeface="Arial" panose="020B0604020202020204" pitchFamily="34" charset="0"/>
+              <a:cs typeface="Arial" panose="020B0604020202020204" pitchFamily="34" charset="0"/>
+            </a:endParaRPr>
+          </a:p>
+        </p:txBody>
+      </p:sp>
+      <p:sp>
+        <p:nvSpPr>
+          <p:cNvPr id="72" name="ZoneTexte 71"/>
+          <p:cNvSpPr txBox="1"/>
+          <p:nvPr/>
+        </p:nvSpPr>
+        <p:spPr>
+          <a:xfrm>
+            <a:off x="739939" y="10387325"/>
+            <a:ext cx="457176" cy="369332"/>
+          </a:xfrm>
+          <a:prstGeom prst="rect">
+            <a:avLst/>
+          </a:prstGeom>
+          <a:noFill/>
+          <a:ln>
+            <a:solidFill>
+              <a:schemeClr val="tx1">
+                <a:lumMod val="75000"/>
+                <a:lumOff val="25000"/>
+              </a:schemeClr>
+            </a:solidFill>
+          </a:ln>
+        </p:spPr>
+        <p:txBody>
+          <a:bodyPr wrap="none" rtlCol="0">
+            <a:spAutoFit/>
+          </a:bodyPr>
+          <a:lstStyle/>
+          <a:p>
+            <a:r>
+              <a:rPr lang="fr-FR" sz="1800" dirty="0" smtClean="0">
+                <a:solidFill>
+                  <a:schemeClr val="tx1">
+                    <a:lumMod val="75000"/>
+                    <a:lumOff val="25000"/>
+                  </a:schemeClr>
+                </a:solidFill>
+                <a:latin typeface="Arial" panose="020B0604020202020204" pitchFamily="34" charset="0"/>
+                <a:cs typeface="Arial" panose="020B0604020202020204" pitchFamily="34" charset="0"/>
+              </a:rPr>
+              <a:t>|E|</a:t>
+            </a:r>
+            <a:endParaRPr lang="fr-FR" sz="1800" dirty="0">
+              <a:solidFill>
+                <a:schemeClr val="tx1">
+                  <a:lumMod val="75000"/>
+                  <a:lumOff val="25000"/>
+                </a:schemeClr>
+              </a:solidFill>
+              <a:latin typeface="Arial" panose="020B0604020202020204" pitchFamily="34" charset="0"/>
+              <a:cs typeface="Arial" panose="020B0604020202020204" pitchFamily="34" charset="0"/>
+            </a:endParaRPr>
+          </a:p>
+        </p:txBody>
+      </p:sp>
+      <p:pic>
+        <p:nvPicPr>
+          <p:cNvPr id="1026" name="Picture 2"/>
+          <p:cNvPicPr>
+            <a:picLocks noChangeAspect="1" noChangeArrowheads="1"/>
+          </p:cNvPicPr>
+          <p:nvPr/>
+        </p:nvPicPr>
+        <p:blipFill rotWithShape="1">
+          <a:blip r:embed="rId23">
+            <a:extLst>
+              <a:ext uri="{28A0092B-C50C-407E-A947-70E740481C1C}">
+                <a14:useLocalDpi xmlns:a14="http://schemas.microsoft.com/office/drawing/2010/main" val="0"/>
+              </a:ext>
+            </a:extLst>
+          </a:blip>
+          <a:srcRect r="85831" b="54666"/>
+          <a:stretch/>
+        </p:blipFill>
+        <p:spPr bwMode="auto">
+          <a:xfrm>
+            <a:off x="2839244" y="6306387"/>
+            <a:ext cx="540369" cy="1559791"/>
+          </a:xfrm>
+          <a:prstGeom prst="rect">
+            <a:avLst/>
+          </a:prstGeom>
+          <a:noFill/>
+          <a:ln>
+            <a:noFill/>
+          </a:ln>
+          <a:extLst>
+            <a:ext uri="{909E8E84-426E-40DD-AFC4-6F175D3DCCD1}">
+              <a14:hiddenFill xmlns:a14="http://schemas.microsoft.com/office/drawing/2010/main">
+                <a:solidFill>
+                  <a:schemeClr val="accent1"/>
+                </a:solidFill>
+              </a14:hiddenFill>
+            </a:ext>
+            <a:ext uri="{91240B29-F687-4F45-9708-019B960494DF}">
+              <a14:hiddenLine xmlns:a14="http://schemas.microsoft.com/office/drawing/2010/main" w="9525">
+                <a:solidFill>
+                  <a:schemeClr val="tx1"/>
+                </a:solidFill>
+                <a:miter lim="800000"/>
+                <a:headEnd/>
+                <a:tailEnd/>
+              </a14:hiddenLine>
+            </a:ext>
+          </a:extLst>
+        </p:spPr>
+      </p:pic>
     </p:spTree>
   </p:cSld>
   <p:clrMapOvr>

</xml_diff>